<commit_message>
added linkedin to final slide
</commit_message>
<xml_diff>
--- a/tdde-py-pyspark-glue-docker-vscode.pptx
+++ b/tdde-py-pyspark-glue-docker-vscode.pptx
@@ -233,7 +233,7 @@
           <a:p>
             <a:fld id="{E4717DEE-46D0-684B-93A0-8B8798D63DB0}" type="datetimeFigureOut">
               <a:rPr lang="en-US" smtClean="0"/>
-              <a:t>5/23/22</a:t>
+              <a:t>5/24/22</a:t>
             </a:fld>
             <a:endParaRPr lang="en-US"/>
           </a:p>
@@ -3506,7 +3506,7 @@
           <a:p>
             <a:fld id="{B6A499C5-BDF4-3F4E-9DE4-A0FD3AB4C7AD}" type="datetimeFigureOut">
               <a:rPr lang="en-US" smtClean="0"/>
-              <a:t>5/23/22</a:t>
+              <a:t>5/24/22</a:t>
             </a:fld>
             <a:endParaRPr lang="en-US"/>
           </a:p>
@@ -3728,7 +3728,7 @@
           <a:p>
             <a:fld id="{B6A499C5-BDF4-3F4E-9DE4-A0FD3AB4C7AD}" type="datetimeFigureOut">
               <a:rPr lang="en-US" smtClean="0"/>
-              <a:t>5/23/22</a:t>
+              <a:t>5/24/22</a:t>
             </a:fld>
             <a:endParaRPr lang="en-US"/>
           </a:p>
@@ -4269,7 +4269,7 @@
           <a:p>
             <a:fld id="{B6A499C5-BDF4-3F4E-9DE4-A0FD3AB4C7AD}" type="datetimeFigureOut">
               <a:rPr lang="en-US" smtClean="0"/>
-              <a:t>5/23/22</a:t>
+              <a:t>5/24/22</a:t>
             </a:fld>
             <a:endParaRPr lang="en-US"/>
           </a:p>
@@ -5235,7 +5235,7 @@
           <a:p>
             <a:fld id="{B6A499C5-BDF4-3F4E-9DE4-A0FD3AB4C7AD}" type="datetimeFigureOut">
               <a:rPr lang="en-US" smtClean="0"/>
-              <a:t>5/23/22</a:t>
+              <a:t>5/24/22</a:t>
             </a:fld>
             <a:endParaRPr lang="en-US"/>
           </a:p>
@@ -5891,7 +5891,7 @@
           <a:p>
             <a:fld id="{B6A499C5-BDF4-3F4E-9DE4-A0FD3AB4C7AD}" type="datetimeFigureOut">
               <a:rPr lang="en-US" smtClean="0"/>
-              <a:t>5/23/22</a:t>
+              <a:t>5/24/22</a:t>
             </a:fld>
             <a:endParaRPr lang="en-US"/>
           </a:p>
@@ -6201,7 +6201,7 @@
           <a:p>
             <a:fld id="{B6A499C5-BDF4-3F4E-9DE4-A0FD3AB4C7AD}" type="datetimeFigureOut">
               <a:rPr lang="en-US" smtClean="0"/>
-              <a:t>5/23/22</a:t>
+              <a:t>5/24/22</a:t>
             </a:fld>
             <a:endParaRPr lang="en-US"/>
           </a:p>
@@ -6452,7 +6452,7 @@
           <a:p>
             <a:fld id="{B6A499C5-BDF4-3F4E-9DE4-A0FD3AB4C7AD}" type="datetimeFigureOut">
               <a:rPr lang="en-US" smtClean="0"/>
-              <a:t>5/23/22</a:t>
+              <a:t>5/24/22</a:t>
             </a:fld>
             <a:endParaRPr lang="en-US"/>
           </a:p>
@@ -9567,7 +9567,7 @@
           <a:p>
             <a:fld id="{B6A499C5-BDF4-3F4E-9DE4-A0FD3AB4C7AD}" type="datetimeFigureOut">
               <a:rPr lang="en-US" smtClean="0"/>
-              <a:t>5/23/22</a:t>
+              <a:t>5/24/22</a:t>
             </a:fld>
             <a:endParaRPr lang="en-US"/>
           </a:p>
@@ -9847,7 +9847,7 @@
           <a:p>
             <a:fld id="{B6A499C5-BDF4-3F4E-9DE4-A0FD3AB4C7AD}" type="datetimeFigureOut">
               <a:rPr lang="en-US" smtClean="0"/>
-              <a:t>5/23/22</a:t>
+              <a:t>5/24/22</a:t>
             </a:fld>
             <a:endParaRPr lang="en-US"/>
           </a:p>
@@ -33433,7 +33433,12 @@
             <p:ph type="title"/>
           </p:nvPr>
         </p:nvSpPr>
-        <p:spPr/>
+        <p:spPr>
+          <a:xfrm>
+            <a:off x="577516" y="2452909"/>
+            <a:ext cx="11036968" cy="712745"/>
+          </a:xfrm>
+        </p:spPr>
         <p:txBody>
           <a:bodyPr/>
           <a:lstStyle/>
@@ -33464,7 +33469,7 @@
         <p:spPr>
           <a:xfrm>
             <a:off x="1678195" y="3892451"/>
-            <a:ext cx="8849956" cy="769441"/>
+            <a:ext cx="8849956" cy="1508105"/>
           </a:xfrm>
           <a:prstGeom prst="rect">
             <a:avLst/>
@@ -33478,8 +33483,22 @@
           <a:lstStyle/>
           <a:p>
             <a:r>
+              <a:rPr lang="en-US" dirty="0" err="1"/>
+              <a:t>Github</a:t>
+            </a:r>
+            <a:r>
               <a:rPr lang="en-US" dirty="0"/>
-              <a:t>https://</a:t>
+              <a:t> </a:t>
+            </a:r>
+            <a:r>
+              <a:rPr lang="en-US" dirty="0">
+                <a:sym typeface="Wingdings" pitchFamily="2" charset="2"/>
+              </a:rPr>
+              <a:t></a:t>
+            </a:r>
+            <a:r>
+              <a:rPr lang="en-US" dirty="0"/>
+              <a:t> https://</a:t>
             </a:r>
             <a:r>
               <a:rPr lang="en-US" dirty="0" err="1"/>
@@ -33500,6 +33519,38 @@
             <a:r>
               <a:rPr lang="en-US" dirty="0" err="1"/>
               <a:t>tdde-py-pyspark</a:t>
+            </a:r>
+            <a:endParaRPr lang="en-US" dirty="0"/>
+          </a:p>
+          <a:p>
+            <a:endParaRPr lang="en-US" dirty="0"/>
+          </a:p>
+          <a:p>
+            <a:r>
+              <a:rPr lang="en-US" dirty="0"/>
+              <a:t>LinkedIn </a:t>
+            </a:r>
+            <a:r>
+              <a:rPr lang="en-US" dirty="0">
+                <a:sym typeface="Wingdings" pitchFamily="2" charset="2"/>
+              </a:rPr>
+              <a:t></a:t>
+            </a:r>
+            <a:r>
+              <a:rPr lang="en-US" dirty="0"/>
+              <a:t> https://</a:t>
+            </a:r>
+            <a:r>
+              <a:rPr lang="en-US" dirty="0" err="1"/>
+              <a:t>www.linkedin.com</a:t>
+            </a:r>
+            <a:r>
+              <a:rPr lang="en-US" dirty="0"/>
+              <a:t>/my/</a:t>
+            </a:r>
+            <a:r>
+              <a:rPr lang="en-US" dirty="0" err="1"/>
+              <a:t>donaldsawyer</a:t>
             </a:r>
             <a:endParaRPr lang="en-US" dirty="0"/>
           </a:p>

</xml_diff>